<commit_message>
git repo link added
</commit_message>
<xml_diff>
--- a/Dynamic_cloud_environments_with_Ansible.pptx
+++ b/Dynamic_cloud_environments_with_Ansible.pptx
@@ -10234,6 +10234,13 @@
       <p:transition xmlns:p14="http://schemas.microsoft.com/office/powerpoint/2010/main"/>
     </mc:Fallback>
   </mc:AlternateContent>
+  <p:timing>
+    <p:tnLst>
+      <p:par>
+        <p:cTn xmlns:p14="http://schemas.microsoft.com/office/powerpoint/2010/main" id="1" dur="indefinite" restart="never" nodeType="tmRoot"/>
+      </p:par>
+    </p:tnLst>
+  </p:timing>
 </p:sld>
 </file>
 
@@ -10849,7 +10856,7 @@
         <p:spPr>
           <a:xfrm>
             <a:off x="1514512" y="2031332"/>
-            <a:ext cx="7248487" cy="1938992"/>
+            <a:ext cx="7248487" cy="2246769"/>
           </a:xfrm>
           <a:prstGeom prst="rect">
             <a:avLst/>
@@ -10912,6 +10919,34 @@
             <a:r>
               <a:rPr lang="en-US" sz="2000" dirty="0" smtClean="0"/>
               <a:t>Simple automation is important</a:t>
+            </a:r>
+          </a:p>
+          <a:p>
+            <a:pPr marL="342900" indent="-342900">
+              <a:buFont typeface="Arial"/>
+              <a:buChar char="•"/>
+            </a:pPr>
+            <a:r>
+              <a:rPr lang="en-US" sz="2000" dirty="0">
+                <a:hlinkClick r:id="rId4"/>
+              </a:rPr>
+              <a:t>https://github.com/zsoltk-iw/ansible-dynamic-cloud-envs</a:t>
+            </a:r>
+            <a:r>
+              <a:rPr lang="en-US" sz="2000">
+                <a:hlinkClick r:id="rId4"/>
+              </a:rPr>
+              <a:t>-</a:t>
+            </a:r>
+            <a:r>
+              <a:rPr lang="en-US" sz="2000" smtClean="0">
+                <a:hlinkClick r:id="rId4"/>
+              </a:rPr>
+              <a:t>talk</a:t>
+            </a:r>
+            <a:r>
+              <a:rPr lang="en-US" sz="2000" smtClean="0"/>
+              <a:t> </a:t>
             </a:r>
             <a:endParaRPr lang="en-GB" sz="2000" dirty="0" smtClean="0"/>
           </a:p>
@@ -10926,7 +10961,7 @@
           <p:nvPr/>
         </p:nvPicPr>
         <p:blipFill>
-          <a:blip r:embed="rId4" cstate="print">
+          <a:blip r:embed="rId5" cstate="print">
             <a:extLst>
               <a:ext uri="{28A0092B-C50C-407E-A947-70E740481C1C}">
                 <a14:useLocalDpi xmlns:a14="http://schemas.microsoft.com/office/drawing/2010/main" val="0"/>
@@ -12189,7 +12224,7 @@
         <p:spPr>
           <a:xfrm>
             <a:off x="1514512" y="2031332"/>
-            <a:ext cx="7248487" cy="2554545"/>
+            <a:ext cx="7248487" cy="2985433"/>
           </a:xfrm>
           <a:prstGeom prst="rect">
             <a:avLst/>
@@ -12222,6 +12257,24 @@
             <a:r>
               <a:rPr lang="en-US" sz="2800" dirty="0" smtClean="0"/>
               <a:t>Groups</a:t>
+            </a:r>
+          </a:p>
+          <a:p>
+            <a:r>
+              <a:rPr lang="en-US" sz="2800" dirty="0" err="1"/>
+              <a:t>h</a:t>
+            </a:r>
+            <a:r>
+              <a:rPr lang="en-US" sz="2800" dirty="0" err="1" smtClean="0"/>
+              <a:t>ost_vars</a:t>
+            </a:r>
+            <a:r>
+              <a:rPr lang="en-US" sz="2800" dirty="0" smtClean="0"/>
+              <a:t> / </a:t>
+            </a:r>
+            <a:r>
+              <a:rPr lang="en-US" sz="2800" dirty="0" err="1" smtClean="0"/>
+              <a:t>group_vars</a:t>
             </a:r>
             <a:endParaRPr lang="en-US" sz="2800" dirty="0"/>
           </a:p>
@@ -12340,15 +12393,7 @@
           <a:p>
             <a:r>
               <a:rPr lang="en-US" sz="2400" dirty="0" smtClean="0"/>
-              <a:t>No predefined </a:t>
-            </a:r>
-            <a:r>
-              <a:rPr lang="en-US" sz="2400" dirty="0" err="1" smtClean="0"/>
-              <a:t>hostfile</a:t>
-            </a:r>
-            <a:r>
-              <a:rPr lang="en-US" sz="2400" dirty="0" smtClean="0"/>
-              <a:t> </a:t>
+              <a:t>No inventory file </a:t>
             </a:r>
             <a:r>
               <a:rPr lang="is-IS" sz="2400" dirty="0" smtClean="0"/>
@@ -12704,8 +12749,19 @@
                 <a:latin typeface="Courier"/>
                 <a:cs typeface="Courier"/>
               </a:rPr>
-              <a:t>Host 10.8.31.*</a:t>
-            </a:r>
+              <a:t>Host 10.8.31.</a:t>
+            </a:r>
+            <a:r>
+              <a:rPr lang="en-US" sz="1200" dirty="0" smtClean="0">
+                <a:latin typeface="Courier"/>
+                <a:cs typeface="Courier"/>
+              </a:rPr>
+              <a:t>*</a:t>
+            </a:r>
+            <a:endParaRPr lang="en-US" sz="1200" dirty="0">
+              <a:latin typeface="Courier"/>
+              <a:cs typeface="Courier"/>
+            </a:endParaRPr>
           </a:p>
           <a:p>
             <a:r>
@@ -13252,17 +13308,31 @@
                 <a:latin typeface="Courier"/>
                 <a:cs typeface="Courier"/>
               </a:rPr>
-              <a:t>  STACK_ID=02-dev ANSIBLE_CONFIG=./</a:t>
-            </a:r>
-            <a:r>
-              <a:rPr lang="en-US" sz="1200" dirty="0" err="1">
+              <a:t>  STACK_ID=02-</a:t>
+            </a:r>
+            <a:r>
+              <a:rPr lang="en-US" sz="1200" dirty="0" smtClean="0">
+                <a:latin typeface="Courier"/>
+                <a:cs typeface="Courier"/>
+              </a:rPr>
+              <a:t>dev </a:t>
+            </a:r>
+            <a:r>
+              <a:rPr lang="en-US" sz="1200" dirty="0">
+                <a:latin typeface="Courier"/>
+                <a:cs typeface="Courier"/>
+              </a:rPr>
+              <a:t>ANSIBLE_CONFIG=./</a:t>
+            </a:r>
+            <a:r>
+              <a:rPr lang="en-US" sz="1200" dirty="0" err="1" smtClean="0">
                 <a:latin typeface="Courier"/>
                 <a:cs typeface="Courier"/>
               </a:rPr>
               <a:t>ansible.cfg</a:t>
             </a:r>
             <a:r>
-              <a:rPr lang="en-US" sz="1200" dirty="0">
+              <a:rPr lang="en-US" sz="1200" dirty="0" smtClean="0">
                 <a:latin typeface="Courier"/>
                 <a:cs typeface="Courier"/>
               </a:rPr>
@@ -13328,17 +13398,31 @@
                 <a:latin typeface="Courier"/>
                 <a:cs typeface="Courier"/>
               </a:rPr>
-              <a:t>  STACK_ID=03-test ANSIBLE_CONFIG=./</a:t>
-            </a:r>
-            <a:r>
-              <a:rPr lang="en-US" sz="1200" dirty="0" err="1">
+              <a:t>  STACK_ID=03</a:t>
+            </a:r>
+            <a:r>
+              <a:rPr lang="en-US" sz="1200" dirty="0" smtClean="0">
+                <a:latin typeface="Courier"/>
+                <a:cs typeface="Courier"/>
+              </a:rPr>
+              <a:t>-dev ANSIBLE_CONFIG</a:t>
+            </a:r>
+            <a:r>
+              <a:rPr lang="en-US" sz="1200" dirty="0">
+                <a:latin typeface="Courier"/>
+                <a:cs typeface="Courier"/>
+              </a:rPr>
+              <a:t>=./</a:t>
+            </a:r>
+            <a:r>
+              <a:rPr lang="en-US" sz="1200" dirty="0" err="1" smtClean="0">
                 <a:latin typeface="Courier"/>
                 <a:cs typeface="Courier"/>
               </a:rPr>
               <a:t>ansible.cfg</a:t>
             </a:r>
             <a:r>
-              <a:rPr lang="en-US" sz="1200" dirty="0">
+              <a:rPr lang="en-US" sz="1200" dirty="0" smtClean="0">
                 <a:latin typeface="Courier"/>
                 <a:cs typeface="Courier"/>
               </a:rPr>

</xml_diff>